<commit_message>
finalized code and ppt
</commit_message>
<xml_diff>
--- a/slides.pptx
+++ b/slides.pptx
@@ -11,8 +11,7 @@
     <p:sldId id="259" r:id="rId5"/>
     <p:sldId id="260" r:id="rId6"/>
     <p:sldId id="261" r:id="rId7"/>
-    <p:sldId id="262" r:id="rId8"/>
-    <p:sldId id="263" r:id="rId9"/>
+    <p:sldId id="263" r:id="rId8"/>
   </p:sldIdLst>
   <p:sldSz cx="12192000" cy="6858000"/>
   <p:notesSz cx="6858000" cy="9144000"/>
@@ -111,6 +110,11 @@
       </a:defRPr>
     </a:lvl9pPr>
   </p:defaultTextStyle>
+  <p:extLst>
+    <p:ext uri="{EFAFB233-063F-42B5-8137-9DF3F51BA10A}">
+      <p15:sldGuideLst xmlns:p15="http://schemas.microsoft.com/office/powerpoint/2012/main"/>
+    </p:ext>
+  </p:extLst>
 </p:presentation>
 </file>
 
@@ -245,7 +249,7 @@
           <a:p>
             <a:fld id="{D46060F0-3181-48B5-959D-FAA9522E4D21}" type="datetimeFigureOut">
               <a:rPr lang="en-US" smtClean="0"/>
-              <a:t>11/21/2015</a:t>
+              <a:t>11/22/2015</a:t>
             </a:fld>
             <a:endParaRPr lang="en-US"/>
           </a:p>
@@ -415,7 +419,7 @@
           <a:p>
             <a:fld id="{D46060F0-3181-48B5-959D-FAA9522E4D21}" type="datetimeFigureOut">
               <a:rPr lang="en-US" smtClean="0"/>
-              <a:t>11/21/2015</a:t>
+              <a:t>11/22/2015</a:t>
             </a:fld>
             <a:endParaRPr lang="en-US"/>
           </a:p>
@@ -595,7 +599,7 @@
           <a:p>
             <a:fld id="{D46060F0-3181-48B5-959D-FAA9522E4D21}" type="datetimeFigureOut">
               <a:rPr lang="en-US" smtClean="0"/>
-              <a:t>11/21/2015</a:t>
+              <a:t>11/22/2015</a:t>
             </a:fld>
             <a:endParaRPr lang="en-US"/>
           </a:p>
@@ -765,7 +769,7 @@
           <a:p>
             <a:fld id="{D46060F0-3181-48B5-959D-FAA9522E4D21}" type="datetimeFigureOut">
               <a:rPr lang="en-US" smtClean="0"/>
-              <a:t>11/21/2015</a:t>
+              <a:t>11/22/2015</a:t>
             </a:fld>
             <a:endParaRPr lang="en-US"/>
           </a:p>
@@ -1011,7 +1015,7 @@
           <a:p>
             <a:fld id="{D46060F0-3181-48B5-959D-FAA9522E4D21}" type="datetimeFigureOut">
               <a:rPr lang="en-US" smtClean="0"/>
-              <a:t>11/21/2015</a:t>
+              <a:t>11/22/2015</a:t>
             </a:fld>
             <a:endParaRPr lang="en-US"/>
           </a:p>
@@ -1243,7 +1247,7 @@
           <a:p>
             <a:fld id="{D46060F0-3181-48B5-959D-FAA9522E4D21}" type="datetimeFigureOut">
               <a:rPr lang="en-US" smtClean="0"/>
-              <a:t>11/21/2015</a:t>
+              <a:t>11/22/2015</a:t>
             </a:fld>
             <a:endParaRPr lang="en-US"/>
           </a:p>
@@ -1610,7 +1614,7 @@
           <a:p>
             <a:fld id="{D46060F0-3181-48B5-959D-FAA9522E4D21}" type="datetimeFigureOut">
               <a:rPr lang="en-US" smtClean="0"/>
-              <a:t>11/21/2015</a:t>
+              <a:t>11/22/2015</a:t>
             </a:fld>
             <a:endParaRPr lang="en-US"/>
           </a:p>
@@ -1728,7 +1732,7 @@
           <a:p>
             <a:fld id="{D46060F0-3181-48B5-959D-FAA9522E4D21}" type="datetimeFigureOut">
               <a:rPr lang="en-US" smtClean="0"/>
-              <a:t>11/21/2015</a:t>
+              <a:t>11/22/2015</a:t>
             </a:fld>
             <a:endParaRPr lang="en-US"/>
           </a:p>
@@ -1823,7 +1827,7 @@
           <a:p>
             <a:fld id="{D46060F0-3181-48B5-959D-FAA9522E4D21}" type="datetimeFigureOut">
               <a:rPr lang="en-US" smtClean="0"/>
-              <a:t>11/21/2015</a:t>
+              <a:t>11/22/2015</a:t>
             </a:fld>
             <a:endParaRPr lang="en-US"/>
           </a:p>
@@ -2100,7 +2104,7 @@
           <a:p>
             <a:fld id="{D46060F0-3181-48B5-959D-FAA9522E4D21}" type="datetimeFigureOut">
               <a:rPr lang="en-US" smtClean="0"/>
-              <a:t>11/21/2015</a:t>
+              <a:t>11/22/2015</a:t>
             </a:fld>
             <a:endParaRPr lang="en-US"/>
           </a:p>
@@ -2353,7 +2357,7 @@
           <a:p>
             <a:fld id="{D46060F0-3181-48B5-959D-FAA9522E4D21}" type="datetimeFigureOut">
               <a:rPr lang="en-US" smtClean="0"/>
-              <a:t>11/21/2015</a:t>
+              <a:t>11/22/2015</a:t>
             </a:fld>
             <a:endParaRPr lang="en-US"/>
           </a:p>
@@ -2566,7 +2570,7 @@
           <a:p>
             <a:fld id="{D46060F0-3181-48B5-959D-FAA9522E4D21}" type="datetimeFigureOut">
               <a:rPr lang="en-US" smtClean="0"/>
-              <a:t>11/21/2015</a:t>
+              <a:t>11/22/2015</a:t>
             </a:fld>
             <a:endParaRPr lang="en-US"/>
           </a:p>
@@ -3293,7 +3297,6 @@
               <a:rPr lang="en-US" dirty="0" smtClean="0"/>
               <a:t>Created by Ricardo Cabello, released around 2010</a:t>
             </a:r>
-            <a:endParaRPr lang="en-US" dirty="0" smtClean="0"/>
           </a:p>
           <a:p>
             <a:r>
@@ -3606,7 +3609,25 @@
           <a:p>
             <a:r>
               <a:rPr lang="en-US" dirty="0" smtClean="0"/>
-              <a:t>Scene, camera, renderer</a:t>
+              <a:t>Scene, camera, </a:t>
+            </a:r>
+            <a:r>
+              <a:rPr lang="en-US" dirty="0" smtClean="0"/>
+              <a:t>renderer</a:t>
+            </a:r>
+          </a:p>
+          <a:p>
+            <a:r>
+              <a:rPr lang="en-US" dirty="0" smtClean="0"/>
+              <a:t>“</a:t>
+            </a:r>
+            <a:r>
+              <a:rPr lang="en-US" dirty="0"/>
+              <a:t>A renderer is what makes an object appear on the screen</a:t>
+            </a:r>
+            <a:r>
+              <a:rPr lang="en-US" dirty="0" smtClean="0"/>
+              <a:t>.”</a:t>
             </a:r>
             <a:endParaRPr lang="en-US" dirty="0"/>
           </a:p>
@@ -3790,81 +3811,6 @@
 </file>
 
 <file path=ppt/slides/slide7.xml><?xml version="1.0" encoding="utf-8"?>
-<p:sld xmlns:a="http://schemas.openxmlformats.org/drawingml/2006/main" xmlns:r="http://schemas.openxmlformats.org/officeDocument/2006/relationships" xmlns:p="http://schemas.openxmlformats.org/presentationml/2006/main">
-  <p:cSld>
-    <p:spTree>
-      <p:nvGrpSpPr>
-        <p:cNvPr id="1" name=""/>
-        <p:cNvGrpSpPr/>
-        <p:nvPr/>
-      </p:nvGrpSpPr>
-      <p:grpSpPr>
-        <a:xfrm>
-          <a:off x="0" y="0"/>
-          <a:ext cx="0" cy="0"/>
-          <a:chOff x="0" y="0"/>
-          <a:chExt cx="0" cy="0"/>
-        </a:xfrm>
-      </p:grpSpPr>
-      <p:sp>
-        <p:nvSpPr>
-          <p:cNvPr id="2" name="Title 1"/>
-          <p:cNvSpPr>
-            <a:spLocks noGrp="1"/>
-          </p:cNvSpPr>
-          <p:nvPr>
-            <p:ph type="title"/>
-          </p:nvPr>
-        </p:nvSpPr>
-        <p:spPr/>
-        <p:txBody>
-          <a:bodyPr/>
-          <a:lstStyle/>
-          <a:p>
-            <a:endParaRPr lang="en-US" dirty="0"/>
-          </a:p>
-        </p:txBody>
-      </p:sp>
-      <p:sp>
-        <p:nvSpPr>
-          <p:cNvPr id="3" name="Content Placeholder 2"/>
-          <p:cNvSpPr>
-            <a:spLocks noGrp="1"/>
-          </p:cNvSpPr>
-          <p:nvPr>
-            <p:ph idx="1"/>
-          </p:nvPr>
-        </p:nvSpPr>
-        <p:spPr/>
-        <p:txBody>
-          <a:bodyPr/>
-          <a:lstStyle/>
-          <a:p>
-            <a:endParaRPr lang="en-US" dirty="0"/>
-          </a:p>
-        </p:txBody>
-      </p:sp>
-    </p:spTree>
-    <p:extLst>
-      <p:ext uri="{BB962C8B-B14F-4D97-AF65-F5344CB8AC3E}">
-        <p14:creationId xmlns:p14="http://schemas.microsoft.com/office/powerpoint/2010/main" val="4148433030"/>
-      </p:ext>
-    </p:extLst>
-  </p:cSld>
-  <p:clrMapOvr>
-    <a:masterClrMapping/>
-  </p:clrMapOvr>
-  <p:timing>
-    <p:tnLst>
-      <p:par>
-        <p:cTn id="1" dur="indefinite" restart="never" nodeType="tmRoot"/>
-      </p:par>
-    </p:tnLst>
-  </p:timing>
-</p:sld>
-</file>
-
-<file path=ppt/slides/slide8.xml><?xml version="1.0" encoding="utf-8"?>
 <p:sld xmlns:a="http://schemas.openxmlformats.org/drawingml/2006/main" xmlns:r="http://schemas.openxmlformats.org/officeDocument/2006/relationships" xmlns:p="http://schemas.openxmlformats.org/presentationml/2006/main">
   <p:cSld>
     <p:spTree>

</xml_diff>